<commit_message>
made changes to ppt added new draw.io file
</commit_message>
<xml_diff>
--- a/docs/Final ppt.pptx
+++ b/docs/Final ppt.pptx
@@ -5101,13 +5101,13 @@
   <p:clrMapOvr>
     <a:masterClrMapping/>
   </p:clrMapOvr>
-  <mc:AlternateContent xmlns:mc="http://schemas.openxmlformats.org/markup-compatibility/2006">
-    <mc:Choice xmlns:p159="http://schemas.microsoft.com/office/powerpoint/2015/09/main" Requires="p159">
+  <mc:AlternateContent xmlns:mc="http://schemas.openxmlformats.org/markup-compatibility/2006" xmlns:p159="http://schemas.microsoft.com/office/powerpoint/2015/09/main">
+    <mc:Choice Requires="p159">
       <p:transition xmlns:p14="http://schemas.microsoft.com/office/powerpoint/2010/main" spd="slow" p14:dur="2000">
         <p159:morph option="byObject"/>
       </p:transition>
     </mc:Choice>
-    <mc:Fallback>
+    <mc:Fallback xmlns="">
       <p:transition spd="slow">
         <p:fade/>
       </p:transition>
@@ -5141,7 +5141,7 @@
         </p:nvSpPr>
         <p:spPr>
           <a:xfrm>
-            <a:off x="311760" y="444960"/>
+            <a:off x="311760" y="0"/>
             <a:ext cx="8520120" cy="612720"/>
           </a:xfrm>
           <a:prstGeom prst="rect">
@@ -5256,10 +5256,10 @@
       </p:sp>
       <p:pic>
         <p:nvPicPr>
-          <p:cNvPr id="4" name="Picture 3">
+          <p:cNvPr id="3" name="Picture 2">
             <a:extLst>
               <a:ext uri="{FF2B5EF4-FFF2-40B4-BE49-F238E27FC236}">
-                <a16:creationId xmlns:a16="http://schemas.microsoft.com/office/drawing/2014/main" id="{89A6FF20-7F8F-1371-F079-2394334D7CF5}"/>
+                <a16:creationId xmlns:a16="http://schemas.microsoft.com/office/drawing/2014/main" id="{7CBDA324-0D79-3901-D33E-9ED561AE6703}"/>
               </a:ext>
             </a:extLst>
           </p:cNvPr>
@@ -5282,8 +5282,8 @@
         </p:blipFill>
         <p:spPr>
           <a:xfrm>
-            <a:off x="2148648" y="1057680"/>
-            <a:ext cx="4114129" cy="3819774"/>
+            <a:off x="2475641" y="612720"/>
+            <a:ext cx="3931661" cy="4298616"/>
           </a:xfrm>
           <a:prstGeom prst="rect">
             <a:avLst/>
@@ -5300,13 +5300,13 @@
   <p:clrMapOvr>
     <a:masterClrMapping/>
   </p:clrMapOvr>
-  <mc:AlternateContent xmlns:mc="http://schemas.openxmlformats.org/markup-compatibility/2006">
-    <mc:Choice xmlns:p159="http://schemas.microsoft.com/office/powerpoint/2015/09/main" Requires="p159">
+  <mc:AlternateContent xmlns:mc="http://schemas.openxmlformats.org/markup-compatibility/2006" xmlns:p159="http://schemas.microsoft.com/office/powerpoint/2015/09/main">
+    <mc:Choice Requires="p159">
       <p:transition xmlns:p14="http://schemas.microsoft.com/office/powerpoint/2010/main" spd="slow" p14:dur="2000">
         <p159:morph option="byObject"/>
       </p:transition>
     </mc:Choice>
-    <mc:Fallback>
+    <mc:Fallback xmlns="">
       <p:transition spd="slow">
         <p:fade/>
       </p:transition>
@@ -5541,13 +5541,13 @@
   <p:clrMapOvr>
     <a:masterClrMapping/>
   </p:clrMapOvr>
-  <mc:AlternateContent xmlns:mc="http://schemas.openxmlformats.org/markup-compatibility/2006">
-    <mc:Choice xmlns:p159="http://schemas.microsoft.com/office/powerpoint/2015/09/main" Requires="p159">
+  <mc:AlternateContent xmlns:mc="http://schemas.openxmlformats.org/markup-compatibility/2006" xmlns:p159="http://schemas.microsoft.com/office/powerpoint/2015/09/main">
+    <mc:Choice Requires="p159">
       <p:transition xmlns:p14="http://schemas.microsoft.com/office/powerpoint/2010/main" spd="slow" p14:dur="2000">
         <p159:morph option="byObject"/>
       </p:transition>
     </mc:Choice>
-    <mc:Fallback>
+    <mc:Fallback xmlns="">
       <p:transition spd="slow">
         <p:fade/>
       </p:transition>
@@ -5783,13 +5783,13 @@
   <p:clrMapOvr>
     <a:masterClrMapping/>
   </p:clrMapOvr>
-  <mc:AlternateContent xmlns:mc="http://schemas.openxmlformats.org/markup-compatibility/2006">
-    <mc:Choice xmlns:p159="http://schemas.microsoft.com/office/powerpoint/2015/09/main" Requires="p159">
+  <mc:AlternateContent xmlns:mc="http://schemas.openxmlformats.org/markup-compatibility/2006" xmlns:p159="http://schemas.microsoft.com/office/powerpoint/2015/09/main">
+    <mc:Choice Requires="p159">
       <p:transition xmlns:p14="http://schemas.microsoft.com/office/powerpoint/2010/main" spd="slow" p14:dur="2000">
         <p159:morph option="byObject"/>
       </p:transition>
     </mc:Choice>
-    <mc:Fallback>
+    <mc:Fallback xmlns="">
       <p:transition spd="slow">
         <p:fade/>
       </p:transition>
@@ -5919,13 +5919,13 @@
   <p:clrMapOvr>
     <a:masterClrMapping/>
   </p:clrMapOvr>
-  <mc:AlternateContent xmlns:mc="http://schemas.openxmlformats.org/markup-compatibility/2006">
-    <mc:Choice xmlns:p159="http://schemas.microsoft.com/office/powerpoint/2015/09/main" Requires="p159">
+  <mc:AlternateContent xmlns:mc="http://schemas.openxmlformats.org/markup-compatibility/2006" xmlns:p159="http://schemas.microsoft.com/office/powerpoint/2015/09/main">
+    <mc:Choice Requires="p159">
       <p:transition xmlns:p14="http://schemas.microsoft.com/office/powerpoint/2010/main" spd="slow" p14:dur="2000">
         <p159:morph option="byObject"/>
       </p:transition>
     </mc:Choice>
-    <mc:Fallback>
+    <mc:Fallback xmlns="">
       <p:transition spd="slow">
         <p:fade/>
       </p:transition>
@@ -6105,13 +6105,13 @@
   <p:clrMapOvr>
     <a:masterClrMapping/>
   </p:clrMapOvr>
-  <mc:AlternateContent xmlns:mc="http://schemas.openxmlformats.org/markup-compatibility/2006">
-    <mc:Choice xmlns:p159="http://schemas.microsoft.com/office/powerpoint/2015/09/main" Requires="p159">
+  <mc:AlternateContent xmlns:mc="http://schemas.openxmlformats.org/markup-compatibility/2006" xmlns:p159="http://schemas.microsoft.com/office/powerpoint/2015/09/main">
+    <mc:Choice Requires="p159">
       <p:transition xmlns:p14="http://schemas.microsoft.com/office/powerpoint/2010/main" spd="slow" p14:dur="2000">
         <p159:morph option="byObject"/>
       </p:transition>
     </mc:Choice>
-    <mc:Fallback>
+    <mc:Fallback xmlns="">
       <p:transition spd="slow">
         <p:fade/>
       </p:transition>
@@ -6290,13 +6290,13 @@
   <p:clrMapOvr>
     <a:masterClrMapping/>
   </p:clrMapOvr>
-  <mc:AlternateContent xmlns:mc="http://schemas.openxmlformats.org/markup-compatibility/2006">
-    <mc:Choice xmlns:p159="http://schemas.microsoft.com/office/powerpoint/2015/09/main" Requires="p159">
+  <mc:AlternateContent xmlns:mc="http://schemas.openxmlformats.org/markup-compatibility/2006" xmlns:p159="http://schemas.microsoft.com/office/powerpoint/2015/09/main">
+    <mc:Choice Requires="p159">
       <p:transition xmlns:p14="http://schemas.microsoft.com/office/powerpoint/2010/main" spd="slow" p14:dur="2000">
         <p159:morph option="byObject"/>
       </p:transition>
     </mc:Choice>
-    <mc:Fallback>
+    <mc:Fallback xmlns="">
       <p:transition spd="slow">
         <p:fade/>
       </p:transition>
@@ -6483,13 +6483,13 @@
   <p:clrMapOvr>
     <a:masterClrMapping/>
   </p:clrMapOvr>
-  <mc:AlternateContent xmlns:mc="http://schemas.openxmlformats.org/markup-compatibility/2006">
-    <mc:Choice xmlns:p159="http://schemas.microsoft.com/office/powerpoint/2015/09/main" Requires="p159">
+  <mc:AlternateContent xmlns:mc="http://schemas.openxmlformats.org/markup-compatibility/2006" xmlns:p159="http://schemas.microsoft.com/office/powerpoint/2015/09/main">
+    <mc:Choice Requires="p159">
       <p:transition xmlns:p14="http://schemas.microsoft.com/office/powerpoint/2010/main" spd="slow" p14:dur="2000">
         <p159:morph option="byObject"/>
       </p:transition>
     </mc:Choice>
-    <mc:Fallback>
+    <mc:Fallback xmlns="">
       <p:transition spd="slow">
         <p:fade/>
       </p:transition>
@@ -6694,13 +6694,13 @@
   <p:clrMapOvr>
     <a:masterClrMapping/>
   </p:clrMapOvr>
-  <mc:AlternateContent xmlns:mc="http://schemas.openxmlformats.org/markup-compatibility/2006">
-    <mc:Choice xmlns:p159="http://schemas.microsoft.com/office/powerpoint/2015/09/main" Requires="p159">
+  <mc:AlternateContent xmlns:mc="http://schemas.openxmlformats.org/markup-compatibility/2006" xmlns:p159="http://schemas.microsoft.com/office/powerpoint/2015/09/main">
+    <mc:Choice Requires="p159">
       <p:transition xmlns:p14="http://schemas.microsoft.com/office/powerpoint/2010/main" spd="slow" p14:dur="2000">
         <p159:morph option="byObject"/>
       </p:transition>
     </mc:Choice>
-    <mc:Fallback>
+    <mc:Fallback xmlns="">
       <p:transition spd="slow">
         <p:fade/>
       </p:transition>
@@ -7588,13 +7588,13 @@
   <p:clrMapOvr>
     <a:masterClrMapping/>
   </p:clrMapOvr>
-  <mc:AlternateContent xmlns:mc="http://schemas.openxmlformats.org/markup-compatibility/2006">
-    <mc:Choice xmlns:p159="http://schemas.microsoft.com/office/powerpoint/2015/09/main" Requires="p159">
+  <mc:AlternateContent xmlns:mc="http://schemas.openxmlformats.org/markup-compatibility/2006" xmlns:p159="http://schemas.microsoft.com/office/powerpoint/2015/09/main">
+    <mc:Choice Requires="p159">
       <p:transition xmlns:p14="http://schemas.microsoft.com/office/powerpoint/2010/main" spd="slow" p14:dur="2000">
         <p159:morph option="byObject"/>
       </p:transition>
     </mc:Choice>
-    <mc:Fallback>
+    <mc:Fallback xmlns="">
       <p:transition spd="slow">
         <p:fade/>
       </p:transition>
@@ -8183,13 +8183,13 @@
   <p:clrMapOvr>
     <a:masterClrMapping/>
   </p:clrMapOvr>
-  <mc:AlternateContent xmlns:mc="http://schemas.openxmlformats.org/markup-compatibility/2006">
-    <mc:Choice xmlns:p159="http://schemas.microsoft.com/office/powerpoint/2015/09/main" Requires="p159">
+  <mc:AlternateContent xmlns:mc="http://schemas.openxmlformats.org/markup-compatibility/2006" xmlns:p159="http://schemas.microsoft.com/office/powerpoint/2015/09/main">
+    <mc:Choice Requires="p159">
       <p:transition xmlns:p14="http://schemas.microsoft.com/office/powerpoint/2010/main" spd="slow" p14:dur="2000">
         <p159:morph option="byObject"/>
       </p:transition>
     </mc:Choice>
-    <mc:Fallback>
+    <mc:Fallback xmlns="">
       <p:transition spd="slow">
         <p:fade/>
       </p:transition>
@@ -8574,13 +8574,13 @@
   <p:clrMapOvr>
     <a:masterClrMapping/>
   </p:clrMapOvr>
-  <mc:AlternateContent xmlns:mc="http://schemas.openxmlformats.org/markup-compatibility/2006">
-    <mc:Choice xmlns:p159="http://schemas.microsoft.com/office/powerpoint/2015/09/main" Requires="p159">
+  <mc:AlternateContent xmlns:mc="http://schemas.openxmlformats.org/markup-compatibility/2006" xmlns:p159="http://schemas.microsoft.com/office/powerpoint/2015/09/main">
+    <mc:Choice Requires="p159">
       <p:transition xmlns:p14="http://schemas.microsoft.com/office/powerpoint/2010/main" spd="slow" p14:dur="2000">
         <p159:morph option="byObject"/>
       </p:transition>
     </mc:Choice>
-    <mc:Fallback>
+    <mc:Fallback xmlns="">
       <p:transition spd="slow">
         <p:fade/>
       </p:transition>
@@ -8866,13 +8866,13 @@
   <p:clrMapOvr>
     <a:masterClrMapping/>
   </p:clrMapOvr>
-  <mc:AlternateContent xmlns:mc="http://schemas.openxmlformats.org/markup-compatibility/2006">
-    <mc:Choice xmlns:p159="http://schemas.microsoft.com/office/powerpoint/2015/09/main" Requires="p159">
+  <mc:AlternateContent xmlns:mc="http://schemas.openxmlformats.org/markup-compatibility/2006" xmlns:p159="http://schemas.microsoft.com/office/powerpoint/2015/09/main">
+    <mc:Choice Requires="p159">
       <p:transition xmlns:p14="http://schemas.microsoft.com/office/powerpoint/2010/main" spd="slow" p14:dur="2000">
         <p159:morph option="byObject"/>
       </p:transition>
     </mc:Choice>
-    <mc:Fallback>
+    <mc:Fallback xmlns="">
       <p:transition spd="slow">
         <p:fade/>
       </p:transition>
@@ -10373,7 +10373,7 @@
         </p:nvGraphicFramePr>
         <p:xfrm>
           <a:off x="0" y="1150470"/>
-          <a:ext cx="9143999" cy="4143166"/>
+          <a:ext cx="9143999" cy="4143294"/>
         </p:xfrm>
         <a:graphic>
           <a:graphicData uri="http://schemas.openxmlformats.org/drawingml/2006/table">
@@ -10789,13 +10789,13 @@
   <p:clrMapOvr>
     <a:masterClrMapping/>
   </p:clrMapOvr>
-  <mc:AlternateContent xmlns:mc="http://schemas.openxmlformats.org/markup-compatibility/2006">
-    <mc:Choice xmlns:p159="http://schemas.microsoft.com/office/powerpoint/2015/09/main" Requires="p159">
+  <mc:AlternateContent xmlns:mc="http://schemas.openxmlformats.org/markup-compatibility/2006" xmlns:p159="http://schemas.microsoft.com/office/powerpoint/2015/09/main">
+    <mc:Choice Requires="p159">
       <p:transition xmlns:p14="http://schemas.microsoft.com/office/powerpoint/2010/main" spd="slow" p14:dur="2000">
         <p159:morph option="byObject"/>
       </p:transition>
     </mc:Choice>
-    <mc:Fallback>
+    <mc:Fallback xmlns="">
       <p:transition spd="slow">
         <p:fade/>
       </p:transition>

</xml_diff>